<commit_message>
Notes of Lecture 3 2022-02-22
</commit_message>
<xml_diff>
--- a/docs/figures/figures.pptx
+++ b/docs/figures/figures.pptx
@@ -109,6 +109,11 @@
       </a:defRPr>
     </a:lvl9pPr>
   </p:defaultTextStyle>
+  <p:extLst>
+    <p:ext uri="{EFAFB233-063F-42B5-8137-9DF3F51BA10A}">
+      <p15:sldGuideLst xmlns:p15="http://schemas.microsoft.com/office/powerpoint/2012/main"/>
+    </p:ext>
+  </p:extLst>
 </p:presentation>
 </file>
 
@@ -194,7 +199,7 @@
           <a:p>
             <a:fld id="{1A392EDF-80CC-FB40-9D4A-404B7EF38DE9}" type="datetimeFigureOut">
               <a:rPr lang="en-US" smtClean="0"/>
-              <a:t>2/7/22</a:t>
+              <a:t>2/22/22</a:t>
             </a:fld>
             <a:endParaRPr lang="en-US"/>
           </a:p>
@@ -863,7 +868,7 @@
           <a:p>
             <a:fld id="{97219364-2005-7641-8B17-0A01D5F53D15}" type="datetimeFigureOut">
               <a:rPr lang="en-US" smtClean="0"/>
-              <a:t>2/7/22</a:t>
+              <a:t>2/22/22</a:t>
             </a:fld>
             <a:endParaRPr lang="en-US"/>
           </a:p>
@@ -1063,7 +1068,7 @@
           <a:p>
             <a:fld id="{97219364-2005-7641-8B17-0A01D5F53D15}" type="datetimeFigureOut">
               <a:rPr lang="en-US" smtClean="0"/>
-              <a:t>2/7/22</a:t>
+              <a:t>2/22/22</a:t>
             </a:fld>
             <a:endParaRPr lang="en-US"/>
           </a:p>
@@ -1273,7 +1278,7 @@
           <a:p>
             <a:fld id="{97219364-2005-7641-8B17-0A01D5F53D15}" type="datetimeFigureOut">
               <a:rPr lang="en-US" smtClean="0"/>
-              <a:t>2/7/22</a:t>
+              <a:t>2/22/22</a:t>
             </a:fld>
             <a:endParaRPr lang="en-US"/>
           </a:p>
@@ -1508,7 +1513,7 @@
           <a:p>
             <a:fld id="{97219364-2005-7641-8B17-0A01D5F53D15}" type="datetimeFigureOut">
               <a:rPr lang="en-US" smtClean="0"/>
-              <a:t>2/7/22</a:t>
+              <a:t>2/22/22</a:t>
             </a:fld>
             <a:endParaRPr lang="en-US"/>
           </a:p>
@@ -1784,7 +1789,7 @@
           <a:p>
             <a:fld id="{97219364-2005-7641-8B17-0A01D5F53D15}" type="datetimeFigureOut">
               <a:rPr lang="en-US" smtClean="0"/>
-              <a:t>2/7/22</a:t>
+              <a:t>2/22/22</a:t>
             </a:fld>
             <a:endParaRPr lang="en-US"/>
           </a:p>
@@ -2052,7 +2057,7 @@
           <a:p>
             <a:fld id="{97219364-2005-7641-8B17-0A01D5F53D15}" type="datetimeFigureOut">
               <a:rPr lang="en-US" smtClean="0"/>
-              <a:t>2/7/22</a:t>
+              <a:t>2/22/22</a:t>
             </a:fld>
             <a:endParaRPr lang="en-US"/>
           </a:p>
@@ -2467,7 +2472,7 @@
           <a:p>
             <a:fld id="{97219364-2005-7641-8B17-0A01D5F53D15}" type="datetimeFigureOut">
               <a:rPr lang="en-US" smtClean="0"/>
-              <a:t>2/7/22</a:t>
+              <a:t>2/22/22</a:t>
             </a:fld>
             <a:endParaRPr lang="en-US"/>
           </a:p>
@@ -2609,7 +2614,7 @@
           <a:p>
             <a:fld id="{97219364-2005-7641-8B17-0A01D5F53D15}" type="datetimeFigureOut">
               <a:rPr lang="en-US" smtClean="0"/>
-              <a:t>2/7/22</a:t>
+              <a:t>2/22/22</a:t>
             </a:fld>
             <a:endParaRPr lang="en-US"/>
           </a:p>
@@ -2722,7 +2727,7 @@
           <a:p>
             <a:fld id="{97219364-2005-7641-8B17-0A01D5F53D15}" type="datetimeFigureOut">
               <a:rPr lang="en-US" smtClean="0"/>
-              <a:t>2/7/22</a:t>
+              <a:t>2/22/22</a:t>
             </a:fld>
             <a:endParaRPr lang="en-US"/>
           </a:p>
@@ -3035,7 +3040,7 @@
           <a:p>
             <a:fld id="{97219364-2005-7641-8B17-0A01D5F53D15}" type="datetimeFigureOut">
               <a:rPr lang="en-US" smtClean="0"/>
-              <a:t>2/7/22</a:t>
+              <a:t>2/22/22</a:t>
             </a:fld>
             <a:endParaRPr lang="en-US"/>
           </a:p>
@@ -3324,7 +3329,7 @@
           <a:p>
             <a:fld id="{97219364-2005-7641-8B17-0A01D5F53D15}" type="datetimeFigureOut">
               <a:rPr lang="en-US" smtClean="0"/>
-              <a:t>2/7/22</a:t>
+              <a:t>2/22/22</a:t>
             </a:fld>
             <a:endParaRPr lang="en-US"/>
           </a:p>
@@ -3567,7 +3572,7 @@
           <a:p>
             <a:fld id="{97219364-2005-7641-8B17-0A01D5F53D15}" type="datetimeFigureOut">
               <a:rPr lang="en-US" smtClean="0"/>
-              <a:t>2/7/22</a:t>
+              <a:t>2/22/22</a:t>
             </a:fld>
             <a:endParaRPr lang="en-US"/>
           </a:p>
@@ -5711,7 +5716,7 @@
         </p:nvSpPr>
         <p:spPr>
           <a:xfrm>
-            <a:off x="1872537" y="343020"/>
+            <a:off x="1872537" y="385062"/>
             <a:ext cx="8446926" cy="707886"/>
           </a:xfrm>
           <a:prstGeom prst="rect">
@@ -5735,7 +5740,1463 @@
                   </a:schemeClr>
                 </a:solidFill>
               </a:rPr>
-              <a:t>Memory Address*</a:t>
+              <a:t>Strong Consistency</a:t>
+            </a:r>
+          </a:p>
+        </p:txBody>
+      </p:sp>
+      <p:sp>
+        <p:nvSpPr>
+          <p:cNvPr id="3" name="Rectangle 2">
+            <a:extLst>
+              <a:ext uri="{FF2B5EF4-FFF2-40B4-BE49-F238E27FC236}">
+                <a16:creationId xmlns:a16="http://schemas.microsoft.com/office/drawing/2014/main" id="{57E180DF-DE85-9244-8588-5C5D730BFF6D}"/>
+              </a:ext>
+            </a:extLst>
+          </p:cNvPr>
+          <p:cNvSpPr/>
+          <p:nvPr/>
+        </p:nvSpPr>
+        <p:spPr>
+          <a:xfrm>
+            <a:off x="5023944" y="1839310"/>
+            <a:ext cx="2144111" cy="2785242"/>
+          </a:xfrm>
+          <a:prstGeom prst="rect">
+            <a:avLst/>
+          </a:prstGeom>
+          <a:solidFill>
+            <a:srgbClr val="002060"/>
+          </a:solidFill>
+          <a:ln>
+            <a:noFill/>
+          </a:ln>
+        </p:spPr>
+        <p:style>
+          <a:lnRef idx="2">
+            <a:schemeClr val="accent1">
+              <a:shade val="50000"/>
+            </a:schemeClr>
+          </a:lnRef>
+          <a:fillRef idx="1">
+            <a:schemeClr val="accent1"/>
+          </a:fillRef>
+          <a:effectRef idx="0">
+            <a:schemeClr val="accent1"/>
+          </a:effectRef>
+          <a:fontRef idx="minor">
+            <a:schemeClr val="lt1"/>
+          </a:fontRef>
+        </p:style>
+        <p:txBody>
+          <a:bodyPr rtlCol="0" anchor="ctr"/>
+          <a:lstStyle/>
+          <a:p>
+            <a:pPr algn="ctr"/>
+            <a:endParaRPr lang="en-US" dirty="0"/>
+          </a:p>
+        </p:txBody>
+      </p:sp>
+      <p:sp>
+        <p:nvSpPr>
+          <p:cNvPr id="4" name="Rectangle 3">
+            <a:extLst>
+              <a:ext uri="{FF2B5EF4-FFF2-40B4-BE49-F238E27FC236}">
+                <a16:creationId xmlns:a16="http://schemas.microsoft.com/office/drawing/2014/main" id="{9A2807D6-BF17-D340-AC87-541721A63147}"/>
+              </a:ext>
+            </a:extLst>
+          </p:cNvPr>
+          <p:cNvSpPr/>
+          <p:nvPr/>
+        </p:nvSpPr>
+        <p:spPr>
+          <a:xfrm>
+            <a:off x="5023943" y="1844565"/>
+            <a:ext cx="2144111" cy="472966"/>
+          </a:xfrm>
+          <a:prstGeom prst="rect">
+            <a:avLst/>
+          </a:prstGeom>
+          <a:solidFill>
+            <a:srgbClr val="002060"/>
+          </a:solidFill>
+        </p:spPr>
+        <p:style>
+          <a:lnRef idx="2">
+            <a:schemeClr val="accent1">
+              <a:shade val="50000"/>
+            </a:schemeClr>
+          </a:lnRef>
+          <a:fillRef idx="1">
+            <a:schemeClr val="accent1"/>
+          </a:fillRef>
+          <a:effectRef idx="0">
+            <a:schemeClr val="accent1"/>
+          </a:effectRef>
+          <a:fontRef idx="minor">
+            <a:schemeClr val="lt1"/>
+          </a:fontRef>
+        </p:style>
+        <p:txBody>
+          <a:bodyPr rtlCol="0" anchor="ctr"/>
+          <a:lstStyle/>
+          <a:p>
+            <a:pPr algn="ctr"/>
+            <a:r>
+              <a:rPr lang="en-US" b="1" dirty="0">
+                <a:solidFill>
+                  <a:schemeClr val="tx1"/>
+                </a:solidFill>
+              </a:rPr>
+              <a:t>Server</a:t>
+            </a:r>
+          </a:p>
+        </p:txBody>
+      </p:sp>
+      <p:sp>
+        <p:nvSpPr>
+          <p:cNvPr id="5" name="Rounded Rectangle 4">
+            <a:extLst>
+              <a:ext uri="{FF2B5EF4-FFF2-40B4-BE49-F238E27FC236}">
+                <a16:creationId xmlns:a16="http://schemas.microsoft.com/office/drawing/2014/main" id="{B209D964-1DDF-4544-A87D-EAA918D0A582}"/>
+              </a:ext>
+            </a:extLst>
+          </p:cNvPr>
+          <p:cNvSpPr/>
+          <p:nvPr/>
+        </p:nvSpPr>
+        <p:spPr>
+          <a:xfrm>
+            <a:off x="5355020" y="2848304"/>
+            <a:ext cx="1534510" cy="1692166"/>
+          </a:xfrm>
+          <a:prstGeom prst="roundRect">
+            <a:avLst/>
+          </a:prstGeom>
+        </p:spPr>
+        <p:style>
+          <a:lnRef idx="2">
+            <a:schemeClr val="accent1">
+              <a:shade val="50000"/>
+            </a:schemeClr>
+          </a:lnRef>
+          <a:fillRef idx="1">
+            <a:schemeClr val="accent1"/>
+          </a:fillRef>
+          <a:effectRef idx="0">
+            <a:schemeClr val="accent1"/>
+          </a:effectRef>
+          <a:fontRef idx="minor">
+            <a:schemeClr val="lt1"/>
+          </a:fontRef>
+        </p:style>
+        <p:txBody>
+          <a:bodyPr rtlCol="0" anchor="ctr"/>
+          <a:lstStyle/>
+          <a:p>
+            <a:pPr algn="ctr"/>
+            <a:r>
+              <a:rPr lang="en-US" dirty="0"/>
+              <a:t>Disk</a:t>
+            </a:r>
+          </a:p>
+          <a:p>
+            <a:pPr algn="ctr"/>
+            <a:endParaRPr lang="en-US" dirty="0"/>
+          </a:p>
+          <a:p>
+            <a:pPr algn="ctr"/>
+            <a:endParaRPr lang="en-US" dirty="0"/>
+          </a:p>
+          <a:p>
+            <a:pPr algn="ctr"/>
+            <a:endParaRPr lang="en-US" dirty="0"/>
+          </a:p>
+          <a:p>
+            <a:pPr algn="ctr"/>
+            <a:endParaRPr lang="en-US" dirty="0"/>
+          </a:p>
+          <a:p>
+            <a:pPr algn="ctr"/>
+            <a:endParaRPr lang="en-US" dirty="0"/>
+          </a:p>
+        </p:txBody>
+      </p:sp>
+      <p:sp>
+        <p:nvSpPr>
+          <p:cNvPr id="6" name="Rectangle 5">
+            <a:extLst>
+              <a:ext uri="{FF2B5EF4-FFF2-40B4-BE49-F238E27FC236}">
+                <a16:creationId xmlns:a16="http://schemas.microsoft.com/office/drawing/2014/main" id="{CBBE307F-ED35-4F47-B59A-17416F2FECEC}"/>
+              </a:ext>
+            </a:extLst>
+          </p:cNvPr>
+          <p:cNvSpPr/>
+          <p:nvPr/>
+        </p:nvSpPr>
+        <p:spPr>
+          <a:xfrm>
+            <a:off x="5602011" y="3226677"/>
+            <a:ext cx="987973" cy="1108841"/>
+          </a:xfrm>
+          <a:prstGeom prst="rect">
+            <a:avLst/>
+          </a:prstGeom>
+          <a:solidFill>
+            <a:srgbClr val="00B0F0"/>
+          </a:solidFill>
+        </p:spPr>
+        <p:style>
+          <a:lnRef idx="2">
+            <a:schemeClr val="accent1">
+              <a:shade val="50000"/>
+            </a:schemeClr>
+          </a:lnRef>
+          <a:fillRef idx="1">
+            <a:schemeClr val="accent1"/>
+          </a:fillRef>
+          <a:effectRef idx="0">
+            <a:schemeClr val="accent1"/>
+          </a:effectRef>
+          <a:fontRef idx="minor">
+            <a:schemeClr val="lt1"/>
+          </a:fontRef>
+        </p:style>
+        <p:txBody>
+          <a:bodyPr rtlCol="0" anchor="ctr"/>
+          <a:lstStyle/>
+          <a:p>
+            <a:pPr algn="ctr"/>
+            <a:endParaRPr lang="en-US" dirty="0"/>
+          </a:p>
+          <a:p>
+            <a:pPr algn="ctr"/>
+            <a:endParaRPr lang="en-US" dirty="0"/>
+          </a:p>
+          <a:p>
+            <a:pPr algn="ctr"/>
+            <a:endParaRPr lang="en-US" dirty="0"/>
+          </a:p>
+        </p:txBody>
+      </p:sp>
+      <p:sp>
+        <p:nvSpPr>
+          <p:cNvPr id="7" name="Rectangle 6">
+            <a:extLst>
+              <a:ext uri="{FF2B5EF4-FFF2-40B4-BE49-F238E27FC236}">
+                <a16:creationId xmlns:a16="http://schemas.microsoft.com/office/drawing/2014/main" id="{A1F8B932-51DB-094A-BEBA-A723BD896C91}"/>
+              </a:ext>
+            </a:extLst>
+          </p:cNvPr>
+          <p:cNvSpPr/>
+          <p:nvPr/>
+        </p:nvSpPr>
+        <p:spPr>
+          <a:xfrm>
+            <a:off x="5602011" y="3231931"/>
+            <a:ext cx="462453" cy="1103587"/>
+          </a:xfrm>
+          <a:prstGeom prst="rect">
+            <a:avLst/>
+          </a:prstGeom>
+        </p:spPr>
+        <p:style>
+          <a:lnRef idx="2">
+            <a:schemeClr val="accent1">
+              <a:shade val="50000"/>
+            </a:schemeClr>
+          </a:lnRef>
+          <a:fillRef idx="1">
+            <a:schemeClr val="accent1"/>
+          </a:fillRef>
+          <a:effectRef idx="0">
+            <a:schemeClr val="accent1"/>
+          </a:effectRef>
+          <a:fontRef idx="minor">
+            <a:schemeClr val="lt1"/>
+          </a:fontRef>
+        </p:style>
+        <p:txBody>
+          <a:bodyPr rtlCol="0" anchor="ctr"/>
+          <a:lstStyle/>
+          <a:p>
+            <a:pPr algn="ctr"/>
+            <a:endParaRPr lang="en-US" dirty="0"/>
+          </a:p>
+          <a:p>
+            <a:pPr algn="ctr"/>
+            <a:r>
+              <a:rPr lang="en-US" dirty="0"/>
+              <a:t>K</a:t>
+            </a:r>
+          </a:p>
+          <a:p>
+            <a:pPr algn="ctr"/>
+            <a:r>
+              <a:rPr lang="en-US" dirty="0">
+                <a:solidFill>
+                  <a:schemeClr val="bg1"/>
+                </a:solidFill>
+              </a:rPr>
+              <a:t>a</a:t>
+            </a:r>
+          </a:p>
+          <a:p>
+            <a:pPr algn="ctr"/>
+            <a:r>
+              <a:rPr lang="en-US" dirty="0">
+                <a:solidFill>
+                  <a:srgbClr val="FFFF00"/>
+                </a:solidFill>
+              </a:rPr>
+              <a:t>x</a:t>
+            </a:r>
+          </a:p>
+          <a:p>
+            <a:pPr algn="ctr"/>
+            <a:endParaRPr lang="en-US" dirty="0"/>
+          </a:p>
+          <a:p>
+            <a:pPr algn="ctr"/>
+            <a:endParaRPr lang="en-US" dirty="0"/>
+          </a:p>
+        </p:txBody>
+      </p:sp>
+      <p:sp>
+        <p:nvSpPr>
+          <p:cNvPr id="9" name="Rectangle 8">
+            <a:extLst>
+              <a:ext uri="{FF2B5EF4-FFF2-40B4-BE49-F238E27FC236}">
+                <a16:creationId xmlns:a16="http://schemas.microsoft.com/office/drawing/2014/main" id="{87B02214-1F2C-D14F-811B-BCDE8243CC92}"/>
+              </a:ext>
+            </a:extLst>
+          </p:cNvPr>
+          <p:cNvSpPr/>
+          <p:nvPr/>
+        </p:nvSpPr>
+        <p:spPr>
+          <a:xfrm>
+            <a:off x="6159064" y="3231931"/>
+            <a:ext cx="462453" cy="1103587"/>
+          </a:xfrm>
+          <a:prstGeom prst="rect">
+            <a:avLst/>
+          </a:prstGeom>
+        </p:spPr>
+        <p:style>
+          <a:lnRef idx="2">
+            <a:schemeClr val="accent1">
+              <a:shade val="50000"/>
+            </a:schemeClr>
+          </a:lnRef>
+          <a:fillRef idx="1">
+            <a:schemeClr val="accent1"/>
+          </a:fillRef>
+          <a:effectRef idx="0">
+            <a:schemeClr val="accent1"/>
+          </a:effectRef>
+          <a:fontRef idx="minor">
+            <a:schemeClr val="lt1"/>
+          </a:fontRef>
+        </p:style>
+        <p:txBody>
+          <a:bodyPr rtlCol="0" anchor="ctr"/>
+          <a:lstStyle/>
+          <a:p>
+            <a:pPr algn="ctr"/>
+            <a:endParaRPr lang="en-US" dirty="0"/>
+          </a:p>
+          <a:p>
+            <a:pPr algn="ctr"/>
+            <a:r>
+              <a:rPr lang="en-US" dirty="0"/>
+              <a:t>V</a:t>
+            </a:r>
+          </a:p>
+          <a:p>
+            <a:pPr algn="ctr"/>
+            <a:r>
+              <a:rPr lang="en-US" dirty="0">
+                <a:solidFill>
+                  <a:schemeClr val="bg1"/>
+                </a:solidFill>
+              </a:rPr>
+              <a:t>2</a:t>
+            </a:r>
+          </a:p>
+          <a:p>
+            <a:pPr algn="ctr"/>
+            <a:r>
+              <a:rPr lang="en-US" dirty="0">
+                <a:solidFill>
+                  <a:srgbClr val="FFFF00"/>
+                </a:solidFill>
+              </a:rPr>
+              <a:t>?</a:t>
+            </a:r>
+          </a:p>
+          <a:p>
+            <a:pPr algn="ctr"/>
+            <a:endParaRPr lang="en-US" dirty="0"/>
+          </a:p>
+          <a:p>
+            <a:pPr algn="ctr"/>
+            <a:endParaRPr lang="en-US" dirty="0"/>
+          </a:p>
+        </p:txBody>
+      </p:sp>
+      <p:sp>
+        <p:nvSpPr>
+          <p:cNvPr id="10" name="Oval 9">
+            <a:extLst>
+              <a:ext uri="{FF2B5EF4-FFF2-40B4-BE49-F238E27FC236}">
+                <a16:creationId xmlns:a16="http://schemas.microsoft.com/office/drawing/2014/main" id="{9369ACB5-FB21-1448-A840-94D0055AB6D2}"/>
+              </a:ext>
+            </a:extLst>
+          </p:cNvPr>
+          <p:cNvSpPr/>
+          <p:nvPr/>
+        </p:nvSpPr>
+        <p:spPr>
+          <a:xfrm>
+            <a:off x="1608077" y="1592223"/>
+            <a:ext cx="1366345" cy="1292772"/>
+          </a:xfrm>
+          <a:prstGeom prst="ellipse">
+            <a:avLst/>
+          </a:prstGeom>
+          <a:solidFill>
+            <a:srgbClr val="FFFF00"/>
+          </a:solidFill>
+        </p:spPr>
+        <p:style>
+          <a:lnRef idx="2">
+            <a:schemeClr val="accent1">
+              <a:shade val="50000"/>
+            </a:schemeClr>
+          </a:lnRef>
+          <a:fillRef idx="1">
+            <a:schemeClr val="accent1"/>
+          </a:fillRef>
+          <a:effectRef idx="0">
+            <a:schemeClr val="accent1"/>
+          </a:effectRef>
+          <a:fontRef idx="minor">
+            <a:schemeClr val="lt1"/>
+          </a:fontRef>
+        </p:style>
+        <p:txBody>
+          <a:bodyPr rtlCol="0" anchor="ctr"/>
+          <a:lstStyle/>
+          <a:p>
+            <a:pPr algn="ctr"/>
+            <a:r>
+              <a:rPr lang="en-US" dirty="0">
+                <a:solidFill>
+                  <a:schemeClr val="bg1"/>
+                </a:solidFill>
+              </a:rPr>
+              <a:t>Client 1</a:t>
+            </a:r>
+          </a:p>
+        </p:txBody>
+      </p:sp>
+      <p:sp>
+        <p:nvSpPr>
+          <p:cNvPr id="11" name="Oval 10">
+            <a:extLst>
+              <a:ext uri="{FF2B5EF4-FFF2-40B4-BE49-F238E27FC236}">
+                <a16:creationId xmlns:a16="http://schemas.microsoft.com/office/drawing/2014/main" id="{F35F6E87-BB1A-A744-9367-129C3C42DD93}"/>
+              </a:ext>
+            </a:extLst>
+          </p:cNvPr>
+          <p:cNvSpPr/>
+          <p:nvPr/>
+        </p:nvSpPr>
+        <p:spPr>
+          <a:xfrm>
+            <a:off x="1608076" y="4106917"/>
+            <a:ext cx="1366345" cy="1292772"/>
+          </a:xfrm>
+          <a:prstGeom prst="ellipse">
+            <a:avLst/>
+          </a:prstGeom>
+          <a:solidFill>
+            <a:srgbClr val="FFFF00"/>
+          </a:solidFill>
+        </p:spPr>
+        <p:style>
+          <a:lnRef idx="2">
+            <a:schemeClr val="accent1">
+              <a:shade val="50000"/>
+            </a:schemeClr>
+          </a:lnRef>
+          <a:fillRef idx="1">
+            <a:schemeClr val="accent1"/>
+          </a:fillRef>
+          <a:effectRef idx="0">
+            <a:schemeClr val="accent1"/>
+          </a:effectRef>
+          <a:fontRef idx="minor">
+            <a:schemeClr val="lt1"/>
+          </a:fontRef>
+        </p:style>
+        <p:txBody>
+          <a:bodyPr rtlCol="0" anchor="ctr"/>
+          <a:lstStyle/>
+          <a:p>
+            <a:pPr algn="ctr"/>
+            <a:r>
+              <a:rPr lang="en-US" dirty="0">
+                <a:solidFill>
+                  <a:schemeClr val="bg1"/>
+                </a:solidFill>
+              </a:rPr>
+              <a:t>Client 2</a:t>
+            </a:r>
+          </a:p>
+        </p:txBody>
+      </p:sp>
+      <p:sp>
+        <p:nvSpPr>
+          <p:cNvPr id="12" name="Oval 11">
+            <a:extLst>
+              <a:ext uri="{FF2B5EF4-FFF2-40B4-BE49-F238E27FC236}">
+                <a16:creationId xmlns:a16="http://schemas.microsoft.com/office/drawing/2014/main" id="{470F81F5-5539-8F4B-9191-B58EB60FA7BC}"/>
+              </a:ext>
+            </a:extLst>
+          </p:cNvPr>
+          <p:cNvSpPr/>
+          <p:nvPr/>
+        </p:nvSpPr>
+        <p:spPr>
+          <a:xfrm>
+            <a:off x="9217578" y="1592223"/>
+            <a:ext cx="1366345" cy="1292772"/>
+          </a:xfrm>
+          <a:prstGeom prst="ellipse">
+            <a:avLst/>
+          </a:prstGeom>
+          <a:solidFill>
+            <a:srgbClr val="FFFF00"/>
+          </a:solidFill>
+        </p:spPr>
+        <p:style>
+          <a:lnRef idx="2">
+            <a:schemeClr val="accent1">
+              <a:shade val="50000"/>
+            </a:schemeClr>
+          </a:lnRef>
+          <a:fillRef idx="1">
+            <a:schemeClr val="accent1"/>
+          </a:fillRef>
+          <a:effectRef idx="0">
+            <a:schemeClr val="accent1"/>
+          </a:effectRef>
+          <a:fontRef idx="minor">
+            <a:schemeClr val="lt1"/>
+          </a:fontRef>
+        </p:style>
+        <p:txBody>
+          <a:bodyPr rtlCol="0" anchor="ctr"/>
+          <a:lstStyle/>
+          <a:p>
+            <a:pPr algn="ctr"/>
+            <a:r>
+              <a:rPr lang="en-US" dirty="0">
+                <a:solidFill>
+                  <a:schemeClr val="bg1"/>
+                </a:solidFill>
+              </a:rPr>
+              <a:t>Client 3</a:t>
+            </a:r>
+          </a:p>
+        </p:txBody>
+      </p:sp>
+      <p:sp>
+        <p:nvSpPr>
+          <p:cNvPr id="13" name="Oval 12">
+            <a:extLst>
+              <a:ext uri="{FF2B5EF4-FFF2-40B4-BE49-F238E27FC236}">
+                <a16:creationId xmlns:a16="http://schemas.microsoft.com/office/drawing/2014/main" id="{CB281D86-6A53-864C-BFBC-A09D8E9258D5}"/>
+              </a:ext>
+            </a:extLst>
+          </p:cNvPr>
+          <p:cNvSpPr/>
+          <p:nvPr/>
+        </p:nvSpPr>
+        <p:spPr>
+          <a:xfrm>
+            <a:off x="9217577" y="4106917"/>
+            <a:ext cx="1366345" cy="1292772"/>
+          </a:xfrm>
+          <a:prstGeom prst="ellipse">
+            <a:avLst/>
+          </a:prstGeom>
+          <a:solidFill>
+            <a:srgbClr val="FFFF00"/>
+          </a:solidFill>
+        </p:spPr>
+        <p:style>
+          <a:lnRef idx="2">
+            <a:schemeClr val="accent1">
+              <a:shade val="50000"/>
+            </a:schemeClr>
+          </a:lnRef>
+          <a:fillRef idx="1">
+            <a:schemeClr val="accent1"/>
+          </a:fillRef>
+          <a:effectRef idx="0">
+            <a:schemeClr val="accent1"/>
+          </a:effectRef>
+          <a:fontRef idx="minor">
+            <a:schemeClr val="lt1"/>
+          </a:fontRef>
+        </p:style>
+        <p:txBody>
+          <a:bodyPr rtlCol="0" anchor="ctr"/>
+          <a:lstStyle/>
+          <a:p>
+            <a:pPr algn="ctr"/>
+            <a:r>
+              <a:rPr lang="en-US" dirty="0">
+                <a:solidFill>
+                  <a:schemeClr val="bg1"/>
+                </a:solidFill>
+              </a:rPr>
+              <a:t>Client 4</a:t>
+            </a:r>
+          </a:p>
+        </p:txBody>
+      </p:sp>
+      <p:cxnSp>
+        <p:nvCxnSpPr>
+          <p:cNvPr id="15" name="Straight Arrow Connector 14">
+            <a:extLst>
+              <a:ext uri="{FF2B5EF4-FFF2-40B4-BE49-F238E27FC236}">
+                <a16:creationId xmlns:a16="http://schemas.microsoft.com/office/drawing/2014/main" id="{7BE25C1B-EDEC-F34A-B7BA-75EC0FF05414}"/>
+              </a:ext>
+            </a:extLst>
+          </p:cNvPr>
+          <p:cNvCxnSpPr>
+            <a:stCxn id="10" idx="6"/>
+            <a:endCxn id="3" idx="1"/>
+          </p:cNvCxnSpPr>
+          <p:nvPr/>
+        </p:nvCxnSpPr>
+        <p:spPr>
+          <a:xfrm>
+            <a:off x="2974422" y="2238609"/>
+            <a:ext cx="2049522" cy="993322"/>
+          </a:xfrm>
+          <a:prstGeom prst="straightConnector1">
+            <a:avLst/>
+          </a:prstGeom>
+          <a:ln>
+            <a:tailEnd type="triangle"/>
+          </a:ln>
+        </p:spPr>
+        <p:style>
+          <a:lnRef idx="1">
+            <a:schemeClr val="accent1"/>
+          </a:lnRef>
+          <a:fillRef idx="0">
+            <a:schemeClr val="accent1"/>
+          </a:fillRef>
+          <a:effectRef idx="0">
+            <a:schemeClr val="accent1"/>
+          </a:effectRef>
+          <a:fontRef idx="minor">
+            <a:schemeClr val="tx1"/>
+          </a:fontRef>
+        </p:style>
+      </p:cxnSp>
+      <p:sp>
+        <p:nvSpPr>
+          <p:cNvPr id="16" name="TextBox 15">
+            <a:extLst>
+              <a:ext uri="{FF2B5EF4-FFF2-40B4-BE49-F238E27FC236}">
+                <a16:creationId xmlns:a16="http://schemas.microsoft.com/office/drawing/2014/main" id="{ADC2E166-8C86-B046-8262-1980E57E9C37}"/>
+              </a:ext>
+            </a:extLst>
+          </p:cNvPr>
+          <p:cNvSpPr txBox="1"/>
+          <p:nvPr/>
+        </p:nvSpPr>
+        <p:spPr>
+          <a:xfrm>
+            <a:off x="3365644" y="2550604"/>
+            <a:ext cx="1267078" cy="369332"/>
+          </a:xfrm>
+          <a:prstGeom prst="rect">
+            <a:avLst/>
+          </a:prstGeom>
+          <a:noFill/>
+        </p:spPr>
+        <p:txBody>
+          <a:bodyPr wrap="none" rtlCol="0">
+            <a:spAutoFit/>
+          </a:bodyPr>
+          <a:lstStyle/>
+          <a:p>
+            <a:r>
+              <a:rPr lang="en-US" dirty="0"/>
+              <a:t>Write x -&gt; 1</a:t>
+            </a:r>
+          </a:p>
+        </p:txBody>
+      </p:sp>
+      <p:cxnSp>
+        <p:nvCxnSpPr>
+          <p:cNvPr id="18" name="Straight Arrow Connector 17">
+            <a:extLst>
+              <a:ext uri="{FF2B5EF4-FFF2-40B4-BE49-F238E27FC236}">
+                <a16:creationId xmlns:a16="http://schemas.microsoft.com/office/drawing/2014/main" id="{784515A4-4D12-9744-9541-5C2DBD7C01A1}"/>
+              </a:ext>
+            </a:extLst>
+          </p:cNvPr>
+          <p:cNvCxnSpPr>
+            <a:stCxn id="11" idx="6"/>
+            <a:endCxn id="3" idx="1"/>
+          </p:cNvCxnSpPr>
+          <p:nvPr/>
+        </p:nvCxnSpPr>
+        <p:spPr>
+          <a:xfrm flipV="1">
+            <a:off x="2974421" y="3231931"/>
+            <a:ext cx="2049523" cy="1521372"/>
+          </a:xfrm>
+          <a:prstGeom prst="straightConnector1">
+            <a:avLst/>
+          </a:prstGeom>
+          <a:ln>
+            <a:tailEnd type="triangle"/>
+          </a:ln>
+        </p:spPr>
+        <p:style>
+          <a:lnRef idx="1">
+            <a:schemeClr val="accent1"/>
+          </a:lnRef>
+          <a:fillRef idx="0">
+            <a:schemeClr val="accent1"/>
+          </a:fillRef>
+          <a:effectRef idx="0">
+            <a:schemeClr val="accent1"/>
+          </a:effectRef>
+          <a:fontRef idx="minor">
+            <a:schemeClr val="tx1"/>
+          </a:fontRef>
+        </p:style>
+      </p:cxnSp>
+      <p:sp>
+        <p:nvSpPr>
+          <p:cNvPr id="19" name="TextBox 18">
+            <a:extLst>
+              <a:ext uri="{FF2B5EF4-FFF2-40B4-BE49-F238E27FC236}">
+                <a16:creationId xmlns:a16="http://schemas.microsoft.com/office/drawing/2014/main" id="{724708C6-F6CE-6948-956F-5FDA0FBB1158}"/>
+              </a:ext>
+            </a:extLst>
+          </p:cNvPr>
+          <p:cNvSpPr txBox="1"/>
+          <p:nvPr/>
+        </p:nvSpPr>
+        <p:spPr>
+          <a:xfrm>
+            <a:off x="3365644" y="3922251"/>
+            <a:ext cx="1267078" cy="369332"/>
+          </a:xfrm>
+          <a:prstGeom prst="rect">
+            <a:avLst/>
+          </a:prstGeom>
+          <a:noFill/>
+        </p:spPr>
+        <p:txBody>
+          <a:bodyPr wrap="none" rtlCol="0">
+            <a:spAutoFit/>
+          </a:bodyPr>
+          <a:lstStyle/>
+          <a:p>
+            <a:r>
+              <a:rPr lang="en-US" dirty="0"/>
+              <a:t>Write x -&gt; 2</a:t>
+            </a:r>
+          </a:p>
+        </p:txBody>
+      </p:sp>
+      <p:cxnSp>
+        <p:nvCxnSpPr>
+          <p:cNvPr id="22" name="Straight Arrow Connector 21">
+            <a:extLst>
+              <a:ext uri="{FF2B5EF4-FFF2-40B4-BE49-F238E27FC236}">
+                <a16:creationId xmlns:a16="http://schemas.microsoft.com/office/drawing/2014/main" id="{FDC9904D-575C-E64C-88D2-C415DBA329AA}"/>
+              </a:ext>
+            </a:extLst>
+          </p:cNvPr>
+          <p:cNvCxnSpPr>
+            <a:stCxn id="12" idx="2"/>
+            <a:endCxn id="3" idx="3"/>
+          </p:cNvCxnSpPr>
+          <p:nvPr/>
+        </p:nvCxnSpPr>
+        <p:spPr>
+          <a:xfrm flipH="1">
+            <a:off x="7168055" y="2238609"/>
+            <a:ext cx="2049523" cy="993322"/>
+          </a:xfrm>
+          <a:prstGeom prst="straightConnector1">
+            <a:avLst/>
+          </a:prstGeom>
+          <a:ln>
+            <a:tailEnd type="triangle"/>
+          </a:ln>
+        </p:spPr>
+        <p:style>
+          <a:lnRef idx="1">
+            <a:schemeClr val="accent1"/>
+          </a:lnRef>
+          <a:fillRef idx="0">
+            <a:schemeClr val="accent1"/>
+          </a:fillRef>
+          <a:effectRef idx="0">
+            <a:schemeClr val="accent1"/>
+          </a:effectRef>
+          <a:fontRef idx="minor">
+            <a:schemeClr val="tx1"/>
+          </a:fontRef>
+        </p:style>
+      </p:cxnSp>
+      <p:cxnSp>
+        <p:nvCxnSpPr>
+          <p:cNvPr id="24" name="Straight Arrow Connector 23">
+            <a:extLst>
+              <a:ext uri="{FF2B5EF4-FFF2-40B4-BE49-F238E27FC236}">
+                <a16:creationId xmlns:a16="http://schemas.microsoft.com/office/drawing/2014/main" id="{47F7AADF-C5CF-AE41-A0A8-02DED7B1A6EC}"/>
+              </a:ext>
+            </a:extLst>
+          </p:cNvPr>
+          <p:cNvCxnSpPr>
+            <a:stCxn id="13" idx="2"/>
+            <a:endCxn id="3" idx="3"/>
+          </p:cNvCxnSpPr>
+          <p:nvPr/>
+        </p:nvCxnSpPr>
+        <p:spPr>
+          <a:xfrm flipH="1" flipV="1">
+            <a:off x="7168055" y="3231931"/>
+            <a:ext cx="2049522" cy="1521372"/>
+          </a:xfrm>
+          <a:prstGeom prst="straightConnector1">
+            <a:avLst/>
+          </a:prstGeom>
+          <a:ln>
+            <a:tailEnd type="triangle"/>
+          </a:ln>
+        </p:spPr>
+        <p:style>
+          <a:lnRef idx="1">
+            <a:schemeClr val="accent1"/>
+          </a:lnRef>
+          <a:fillRef idx="0">
+            <a:schemeClr val="accent1"/>
+          </a:fillRef>
+          <a:effectRef idx="0">
+            <a:schemeClr val="accent1"/>
+          </a:effectRef>
+          <a:fontRef idx="minor">
+            <a:schemeClr val="tx1"/>
+          </a:fontRef>
+        </p:style>
+      </p:cxnSp>
+      <p:sp>
+        <p:nvSpPr>
+          <p:cNvPr id="25" name="TextBox 24">
+            <a:extLst>
+              <a:ext uri="{FF2B5EF4-FFF2-40B4-BE49-F238E27FC236}">
+                <a16:creationId xmlns:a16="http://schemas.microsoft.com/office/drawing/2014/main" id="{AE4FB970-39BD-9944-A31F-7DC885091A4C}"/>
+              </a:ext>
+            </a:extLst>
+          </p:cNvPr>
+          <p:cNvSpPr txBox="1"/>
+          <p:nvPr/>
+        </p:nvSpPr>
+        <p:spPr>
+          <a:xfrm>
+            <a:off x="7514316" y="2550604"/>
+            <a:ext cx="1134413" cy="369332"/>
+          </a:xfrm>
+          <a:prstGeom prst="rect">
+            <a:avLst/>
+          </a:prstGeom>
+          <a:noFill/>
+        </p:spPr>
+        <p:txBody>
+          <a:bodyPr wrap="none" rtlCol="0">
+            <a:spAutoFit/>
+          </a:bodyPr>
+          <a:lstStyle/>
+          <a:p>
+            <a:r>
+              <a:rPr lang="en-US" dirty="0"/>
+              <a:t>Read x = ?</a:t>
+            </a:r>
+          </a:p>
+        </p:txBody>
+      </p:sp>
+      <p:sp>
+        <p:nvSpPr>
+          <p:cNvPr id="26" name="TextBox 25">
+            <a:extLst>
+              <a:ext uri="{FF2B5EF4-FFF2-40B4-BE49-F238E27FC236}">
+                <a16:creationId xmlns:a16="http://schemas.microsoft.com/office/drawing/2014/main" id="{8270AD70-F92F-4346-A6C4-E9338ECF407A}"/>
+              </a:ext>
+            </a:extLst>
+          </p:cNvPr>
+          <p:cNvSpPr txBox="1"/>
+          <p:nvPr/>
+        </p:nvSpPr>
+        <p:spPr>
+          <a:xfrm>
+            <a:off x="7525476" y="3913258"/>
+            <a:ext cx="1134413" cy="369332"/>
+          </a:xfrm>
+          <a:prstGeom prst="rect">
+            <a:avLst/>
+          </a:prstGeom>
+          <a:noFill/>
+        </p:spPr>
+        <p:txBody>
+          <a:bodyPr wrap="none" rtlCol="0">
+            <a:spAutoFit/>
+          </a:bodyPr>
+          <a:lstStyle/>
+          <a:p>
+            <a:r>
+              <a:rPr lang="en-US" dirty="0"/>
+              <a:t>Read x = ?</a:t>
+            </a:r>
+          </a:p>
+        </p:txBody>
+      </p:sp>
+      <p:sp>
+        <p:nvSpPr>
+          <p:cNvPr id="27" name="Rectangle 26">
+            <a:extLst>
+              <a:ext uri="{FF2B5EF4-FFF2-40B4-BE49-F238E27FC236}">
+                <a16:creationId xmlns:a16="http://schemas.microsoft.com/office/drawing/2014/main" id="{F42E01F7-791C-EF48-9CE0-AC342A53EE20}"/>
+              </a:ext>
+            </a:extLst>
+          </p:cNvPr>
+          <p:cNvSpPr/>
+          <p:nvPr/>
+        </p:nvSpPr>
+        <p:spPr>
+          <a:xfrm>
+            <a:off x="4632722" y="5378891"/>
+            <a:ext cx="3037352" cy="1316421"/>
+          </a:xfrm>
+          <a:prstGeom prst="rect">
+            <a:avLst/>
+          </a:prstGeom>
+          <a:solidFill>
+            <a:schemeClr val="tx1"/>
+          </a:solidFill>
+        </p:spPr>
+        <p:style>
+          <a:lnRef idx="2">
+            <a:schemeClr val="accent1">
+              <a:shade val="50000"/>
+            </a:schemeClr>
+          </a:lnRef>
+          <a:fillRef idx="1">
+            <a:schemeClr val="accent1"/>
+          </a:fillRef>
+          <a:effectRef idx="0">
+            <a:schemeClr val="accent1"/>
+          </a:effectRef>
+          <a:fontRef idx="minor">
+            <a:schemeClr val="lt1"/>
+          </a:fontRef>
+        </p:style>
+        <p:txBody>
+          <a:bodyPr rtlCol="0" anchor="ctr"/>
+          <a:lstStyle/>
+          <a:p>
+            <a:pPr algn="ctr"/>
+            <a:endParaRPr lang="en-US" dirty="0"/>
+          </a:p>
+        </p:txBody>
+      </p:sp>
+      <p:sp>
+        <p:nvSpPr>
+          <p:cNvPr id="28" name="TextBox 27">
+            <a:extLst>
+              <a:ext uri="{FF2B5EF4-FFF2-40B4-BE49-F238E27FC236}">
+                <a16:creationId xmlns:a16="http://schemas.microsoft.com/office/drawing/2014/main" id="{AC6E73DB-D9BA-A849-8821-8DA82B0E8614}"/>
+              </a:ext>
+            </a:extLst>
+          </p:cNvPr>
+          <p:cNvSpPr txBox="1"/>
+          <p:nvPr/>
+        </p:nvSpPr>
+        <p:spPr>
+          <a:xfrm>
+            <a:off x="5446428" y="5071243"/>
+            <a:ext cx="1299138" cy="369332"/>
+          </a:xfrm>
+          <a:prstGeom prst="rect">
+            <a:avLst/>
+          </a:prstGeom>
+          <a:noFill/>
+        </p:spPr>
+        <p:txBody>
+          <a:bodyPr wrap="none" rtlCol="0">
+            <a:spAutoFit/>
+          </a:bodyPr>
+          <a:lstStyle/>
+          <a:p>
+            <a:r>
+              <a:rPr lang="en-US" dirty="0"/>
+              <a:t>Time Stamp</a:t>
+            </a:r>
+          </a:p>
+        </p:txBody>
+      </p:sp>
+      <p:sp>
+        <p:nvSpPr>
+          <p:cNvPr id="29" name="Rounded Rectangle 28">
+            <a:extLst>
+              <a:ext uri="{FF2B5EF4-FFF2-40B4-BE49-F238E27FC236}">
+                <a16:creationId xmlns:a16="http://schemas.microsoft.com/office/drawing/2014/main" id="{72FD4CC8-2917-2049-8DEA-FF68224ADA2A}"/>
+              </a:ext>
+            </a:extLst>
+          </p:cNvPr>
+          <p:cNvSpPr/>
+          <p:nvPr/>
+        </p:nvSpPr>
+        <p:spPr>
+          <a:xfrm>
+            <a:off x="4753668" y="5418399"/>
+            <a:ext cx="683029" cy="266542"/>
+          </a:xfrm>
+          <a:prstGeom prst="roundRect">
+            <a:avLst/>
+          </a:prstGeom>
+          <a:solidFill>
+            <a:srgbClr val="FFFF00"/>
+          </a:solidFill>
+          <a:ln>
+            <a:solidFill>
+              <a:schemeClr val="bg1"/>
+            </a:solidFill>
+          </a:ln>
+        </p:spPr>
+        <p:style>
+          <a:lnRef idx="2">
+            <a:schemeClr val="accent1">
+              <a:shade val="50000"/>
+            </a:schemeClr>
+          </a:lnRef>
+          <a:fillRef idx="1">
+            <a:schemeClr val="accent1"/>
+          </a:fillRef>
+          <a:effectRef idx="0">
+            <a:schemeClr val="accent1"/>
+          </a:effectRef>
+          <a:fontRef idx="minor">
+            <a:schemeClr val="lt1"/>
+          </a:fontRef>
+        </p:style>
+        <p:txBody>
+          <a:bodyPr rtlCol="0" anchor="ctr"/>
+          <a:lstStyle/>
+          <a:p>
+            <a:pPr algn="ctr"/>
+            <a:r>
+              <a:rPr lang="en-US" sz="1200" b="1" dirty="0">
+                <a:solidFill>
+                  <a:schemeClr val="bg1"/>
+                </a:solidFill>
+              </a:rPr>
+              <a:t>Client1</a:t>
+            </a:r>
+          </a:p>
+        </p:txBody>
+      </p:sp>
+      <p:sp>
+        <p:nvSpPr>
+          <p:cNvPr id="36" name="Rounded Rectangle 35">
+            <a:extLst>
+              <a:ext uri="{FF2B5EF4-FFF2-40B4-BE49-F238E27FC236}">
+                <a16:creationId xmlns:a16="http://schemas.microsoft.com/office/drawing/2014/main" id="{36F56600-977C-A24F-B86C-243859C3D338}"/>
+              </a:ext>
+            </a:extLst>
+          </p:cNvPr>
+          <p:cNvSpPr/>
+          <p:nvPr/>
+        </p:nvSpPr>
+        <p:spPr>
+          <a:xfrm>
+            <a:off x="4753665" y="5750359"/>
+            <a:ext cx="683029" cy="266542"/>
+          </a:xfrm>
+          <a:prstGeom prst="roundRect">
+            <a:avLst/>
+          </a:prstGeom>
+          <a:solidFill>
+            <a:srgbClr val="FFFF00"/>
+          </a:solidFill>
+          <a:ln>
+            <a:solidFill>
+              <a:schemeClr val="bg1"/>
+            </a:solidFill>
+          </a:ln>
+        </p:spPr>
+        <p:style>
+          <a:lnRef idx="2">
+            <a:schemeClr val="accent1">
+              <a:shade val="50000"/>
+            </a:schemeClr>
+          </a:lnRef>
+          <a:fillRef idx="1">
+            <a:schemeClr val="accent1"/>
+          </a:fillRef>
+          <a:effectRef idx="0">
+            <a:schemeClr val="accent1"/>
+          </a:effectRef>
+          <a:fontRef idx="minor">
+            <a:schemeClr val="lt1"/>
+          </a:fontRef>
+        </p:style>
+        <p:txBody>
+          <a:bodyPr rtlCol="0" anchor="ctr"/>
+          <a:lstStyle/>
+          <a:p>
+            <a:pPr algn="ctr"/>
+            <a:r>
+              <a:rPr lang="en-US" sz="1200" b="1" dirty="0">
+                <a:solidFill>
+                  <a:schemeClr val="bg1"/>
+                </a:solidFill>
+              </a:rPr>
+              <a:t>Client2</a:t>
+            </a:r>
+          </a:p>
+        </p:txBody>
+      </p:sp>
+      <p:sp>
+        <p:nvSpPr>
+          <p:cNvPr id="37" name="Rounded Rectangle 36">
+            <a:extLst>
+              <a:ext uri="{FF2B5EF4-FFF2-40B4-BE49-F238E27FC236}">
+                <a16:creationId xmlns:a16="http://schemas.microsoft.com/office/drawing/2014/main" id="{7458F63C-1943-D349-8798-47F7B1896FED}"/>
+              </a:ext>
+            </a:extLst>
+          </p:cNvPr>
+          <p:cNvSpPr/>
+          <p:nvPr/>
+        </p:nvSpPr>
+        <p:spPr>
+          <a:xfrm>
+            <a:off x="4743149" y="6078354"/>
+            <a:ext cx="683029" cy="266542"/>
+          </a:xfrm>
+          <a:prstGeom prst="roundRect">
+            <a:avLst/>
+          </a:prstGeom>
+          <a:solidFill>
+            <a:srgbClr val="FFFF00"/>
+          </a:solidFill>
+          <a:ln>
+            <a:solidFill>
+              <a:schemeClr val="bg1"/>
+            </a:solidFill>
+          </a:ln>
+        </p:spPr>
+        <p:style>
+          <a:lnRef idx="2">
+            <a:schemeClr val="accent1">
+              <a:shade val="50000"/>
+            </a:schemeClr>
+          </a:lnRef>
+          <a:fillRef idx="1">
+            <a:schemeClr val="accent1"/>
+          </a:fillRef>
+          <a:effectRef idx="0">
+            <a:schemeClr val="accent1"/>
+          </a:effectRef>
+          <a:fontRef idx="minor">
+            <a:schemeClr val="lt1"/>
+          </a:fontRef>
+        </p:style>
+        <p:txBody>
+          <a:bodyPr rtlCol="0" anchor="ctr"/>
+          <a:lstStyle/>
+          <a:p>
+            <a:pPr algn="ctr"/>
+            <a:r>
+              <a:rPr lang="en-US" sz="1200" b="1" dirty="0">
+                <a:solidFill>
+                  <a:schemeClr val="bg1"/>
+                </a:solidFill>
+              </a:rPr>
+              <a:t>Client3</a:t>
+            </a:r>
+          </a:p>
+        </p:txBody>
+      </p:sp>
+      <p:sp>
+        <p:nvSpPr>
+          <p:cNvPr id="38" name="Rounded Rectangle 37">
+            <a:extLst>
+              <a:ext uri="{FF2B5EF4-FFF2-40B4-BE49-F238E27FC236}">
+                <a16:creationId xmlns:a16="http://schemas.microsoft.com/office/drawing/2014/main" id="{67C1A41D-4744-C441-A707-EC24E06B6BB4}"/>
+              </a:ext>
+            </a:extLst>
+          </p:cNvPr>
+          <p:cNvSpPr/>
+          <p:nvPr/>
+        </p:nvSpPr>
+        <p:spPr>
+          <a:xfrm>
+            <a:off x="4743149" y="6408474"/>
+            <a:ext cx="683029" cy="266542"/>
+          </a:xfrm>
+          <a:prstGeom prst="roundRect">
+            <a:avLst/>
+          </a:prstGeom>
+          <a:solidFill>
+            <a:srgbClr val="FFFF00"/>
+          </a:solidFill>
+          <a:ln>
+            <a:solidFill>
+              <a:schemeClr val="bg1"/>
+            </a:solidFill>
+          </a:ln>
+        </p:spPr>
+        <p:style>
+          <a:lnRef idx="2">
+            <a:schemeClr val="accent1">
+              <a:shade val="50000"/>
+            </a:schemeClr>
+          </a:lnRef>
+          <a:fillRef idx="1">
+            <a:schemeClr val="accent1"/>
+          </a:fillRef>
+          <a:effectRef idx="0">
+            <a:schemeClr val="accent1"/>
+          </a:effectRef>
+          <a:fontRef idx="minor">
+            <a:schemeClr val="lt1"/>
+          </a:fontRef>
+        </p:style>
+        <p:txBody>
+          <a:bodyPr rtlCol="0" anchor="ctr"/>
+          <a:lstStyle/>
+          <a:p>
+            <a:pPr algn="ctr"/>
+            <a:r>
+              <a:rPr lang="en-US" sz="1200" b="1" dirty="0">
+                <a:solidFill>
+                  <a:schemeClr val="bg1"/>
+                </a:solidFill>
+              </a:rPr>
+              <a:t>Client4</a:t>
+            </a:r>
+          </a:p>
+        </p:txBody>
+      </p:sp>
+      <p:sp>
+        <p:nvSpPr>
+          <p:cNvPr id="39" name="Rounded Rectangle 38">
+            <a:extLst>
+              <a:ext uri="{FF2B5EF4-FFF2-40B4-BE49-F238E27FC236}">
+                <a16:creationId xmlns:a16="http://schemas.microsoft.com/office/drawing/2014/main" id="{F44965A5-2C84-4047-A90F-A39219076E05}"/>
+              </a:ext>
+            </a:extLst>
+          </p:cNvPr>
+          <p:cNvSpPr/>
+          <p:nvPr/>
+        </p:nvSpPr>
+        <p:spPr>
+          <a:xfrm>
+            <a:off x="5554387" y="5414714"/>
+            <a:ext cx="578068" cy="273912"/>
+          </a:xfrm>
+          <a:prstGeom prst="roundRect">
+            <a:avLst/>
+          </a:prstGeom>
+        </p:spPr>
+        <p:style>
+          <a:lnRef idx="2">
+            <a:schemeClr val="accent1">
+              <a:shade val="50000"/>
+            </a:schemeClr>
+          </a:lnRef>
+          <a:fillRef idx="1">
+            <a:schemeClr val="accent1"/>
+          </a:fillRef>
+          <a:effectRef idx="0">
+            <a:schemeClr val="accent1"/>
+          </a:effectRef>
+          <a:fontRef idx="minor">
+            <a:schemeClr val="lt1"/>
+          </a:fontRef>
+        </p:style>
+        <p:txBody>
+          <a:bodyPr rtlCol="0" anchor="ctr"/>
+          <a:lstStyle/>
+          <a:p>
+            <a:pPr algn="ctr"/>
+            <a:r>
+              <a:rPr lang="en-US" sz="1200" dirty="0"/>
+              <a:t>Wx1</a:t>
+            </a:r>
+          </a:p>
+        </p:txBody>
+      </p:sp>
+      <p:sp>
+        <p:nvSpPr>
+          <p:cNvPr id="40" name="Rounded Rectangle 39">
+            <a:extLst>
+              <a:ext uri="{FF2B5EF4-FFF2-40B4-BE49-F238E27FC236}">
+                <a16:creationId xmlns:a16="http://schemas.microsoft.com/office/drawing/2014/main" id="{55153D57-2C0C-9F43-8219-4E8D625A653B}"/>
+              </a:ext>
+            </a:extLst>
+          </p:cNvPr>
+          <p:cNvSpPr/>
+          <p:nvPr/>
+        </p:nvSpPr>
+        <p:spPr>
+          <a:xfrm>
+            <a:off x="5556462" y="5746674"/>
+            <a:ext cx="578068" cy="273912"/>
+          </a:xfrm>
+          <a:prstGeom prst="roundRect">
+            <a:avLst/>
+          </a:prstGeom>
+        </p:spPr>
+        <p:style>
+          <a:lnRef idx="2">
+            <a:schemeClr val="accent1">
+              <a:shade val="50000"/>
+            </a:schemeClr>
+          </a:lnRef>
+          <a:fillRef idx="1">
+            <a:schemeClr val="accent1"/>
+          </a:fillRef>
+          <a:effectRef idx="0">
+            <a:schemeClr val="accent1"/>
+          </a:effectRef>
+          <a:fontRef idx="minor">
+            <a:schemeClr val="lt1"/>
+          </a:fontRef>
+        </p:style>
+        <p:txBody>
+          <a:bodyPr rtlCol="0" anchor="ctr"/>
+          <a:lstStyle/>
+          <a:p>
+            <a:pPr algn="ctr"/>
+            <a:r>
+              <a:rPr lang="en-US" sz="1200" dirty="0"/>
+              <a:t>Wx2</a:t>
+            </a:r>
+          </a:p>
+        </p:txBody>
+      </p:sp>
+      <p:sp>
+        <p:nvSpPr>
+          <p:cNvPr id="41" name="Rounded Rectangle 40">
+            <a:extLst>
+              <a:ext uri="{FF2B5EF4-FFF2-40B4-BE49-F238E27FC236}">
+                <a16:creationId xmlns:a16="http://schemas.microsoft.com/office/drawing/2014/main" id="{B6DC36CE-E663-3641-AE54-A292DBA130F9}"/>
+              </a:ext>
+            </a:extLst>
+          </p:cNvPr>
+          <p:cNvSpPr/>
+          <p:nvPr/>
+        </p:nvSpPr>
+        <p:spPr>
+          <a:xfrm>
+            <a:off x="6254298" y="6016901"/>
+            <a:ext cx="578068" cy="273912"/>
+          </a:xfrm>
+          <a:prstGeom prst="roundRect">
+            <a:avLst/>
+          </a:prstGeom>
+        </p:spPr>
+        <p:style>
+          <a:lnRef idx="2">
+            <a:schemeClr val="accent1">
+              <a:shade val="50000"/>
+            </a:schemeClr>
+          </a:lnRef>
+          <a:fillRef idx="1">
+            <a:schemeClr val="accent1"/>
+          </a:fillRef>
+          <a:effectRef idx="0">
+            <a:schemeClr val="accent1"/>
+          </a:effectRef>
+          <a:fontRef idx="minor">
+            <a:schemeClr val="lt1"/>
+          </a:fontRef>
+        </p:style>
+        <p:txBody>
+          <a:bodyPr rtlCol="0" anchor="ctr"/>
+          <a:lstStyle/>
+          <a:p>
+            <a:pPr algn="ctr"/>
+            <a:r>
+              <a:rPr lang="en-US" sz="1200" dirty="0"/>
+              <a:t>Rx?</a:t>
+            </a:r>
+          </a:p>
+        </p:txBody>
+      </p:sp>
+      <p:sp>
+        <p:nvSpPr>
+          <p:cNvPr id="42" name="Rounded Rectangle 41">
+            <a:extLst>
+              <a:ext uri="{FF2B5EF4-FFF2-40B4-BE49-F238E27FC236}">
+                <a16:creationId xmlns:a16="http://schemas.microsoft.com/office/drawing/2014/main" id="{4D0F8630-6270-B342-B688-CA06F6ED255C}"/>
+              </a:ext>
+            </a:extLst>
+          </p:cNvPr>
+          <p:cNvSpPr/>
+          <p:nvPr/>
+        </p:nvSpPr>
+        <p:spPr>
+          <a:xfrm>
+            <a:off x="6916449" y="6344896"/>
+            <a:ext cx="578068" cy="273912"/>
+          </a:xfrm>
+          <a:prstGeom prst="roundRect">
+            <a:avLst/>
+          </a:prstGeom>
+        </p:spPr>
+        <p:style>
+          <a:lnRef idx="2">
+            <a:schemeClr val="accent1">
+              <a:shade val="50000"/>
+            </a:schemeClr>
+          </a:lnRef>
+          <a:fillRef idx="1">
+            <a:schemeClr val="accent1"/>
+          </a:fillRef>
+          <a:effectRef idx="0">
+            <a:schemeClr val="accent1"/>
+          </a:effectRef>
+          <a:fontRef idx="minor">
+            <a:schemeClr val="lt1"/>
+          </a:fontRef>
+        </p:style>
+        <p:txBody>
+          <a:bodyPr rtlCol="0" anchor="ctr"/>
+          <a:lstStyle/>
+          <a:p>
+            <a:pPr algn="ctr"/>
+            <a:r>
+              <a:rPr lang="en-US" sz="1200" dirty="0"/>
+              <a:t>Rx?</a:t>
             </a:r>
           </a:p>
         </p:txBody>

</xml_diff>